<commit_message>
seasonality and td tests
</commit_message>
<xml_diff>
--- a/Presentations/1.6 Seasonality tests.pptx
+++ b/Presentations/1.6 Seasonality tests.pptx
@@ -661,7 +661,7 @@
           <a:p>
             <a:fld id="{82CDFBDA-F2A4-4B44-9954-4627E2F3B4D5}" type="datetimeFigureOut">
               <a:rPr lang="en-GB" smtClean="0"/>
-              <a:t>28/09/2024</a:t>
+              <a:t>11/10/2024</a:t>
             </a:fld>
             <a:endParaRPr lang="en-GB"/>
           </a:p>
@@ -5729,8 +5729,8 @@
           </a:p>
         </p:txBody>
       </p:sp>
-      <mc:AlternateContent xmlns:mc="http://schemas.openxmlformats.org/markup-compatibility/2006" xmlns:a14="http://schemas.microsoft.com/office/drawing/2010/main">
-        <mc:Choice Requires="a14">
+      <mc:AlternateContent xmlns:mc="http://schemas.openxmlformats.org/markup-compatibility/2006">
+        <mc:Choice xmlns:a14="http://schemas.microsoft.com/office/drawing/2010/main" Requires="a14">
           <p:sp>
             <p:nvSpPr>
               <p:cNvPr id="3" name="Content Placeholder 2">
@@ -5761,6 +5761,10 @@
               </a:p>
               <a:p>
                 <a:pPr lvl="1"/>
+                <a:r>
+                  <a:rPr lang="en-GB" dirty="0"/>
+                  <a:t>Modified </a:t>
+                </a:r>
                 <a:r>
                   <a:rPr lang="en-GB" dirty="0" err="1"/>
                   <a:t>Ljung</a:t>
@@ -6448,7 +6452,7 @@
             </p:txBody>
           </p:sp>
         </mc:Choice>
-        <mc:Fallback xmlns="">
+        <mc:Fallback>
           <p:sp>
             <p:nvSpPr>
               <p:cNvPr id="3" name="Content Placeholder 2">
@@ -8124,7 +8128,7 @@
           <a:p>
             <a:r>
               <a:rPr lang="en-GB" b="1" dirty="0"/>
-              <a:t>Canova-Hansen test</a:t>
+              <a:t>Canova-Hansen test (R only)</a:t>
             </a:r>
           </a:p>
           <a:p>
@@ -9344,7 +9348,27 @@
           <a:bodyPr/>
           <a:lstStyle/>
           <a:p>
-            <a:endParaRPr lang="en-GB"/>
+            <a:r>
+              <a:rPr lang="fr-BE" dirty="0"/>
+              <a:t>Trading </a:t>
+            </a:r>
+            <a:r>
+              <a:rPr lang="fr-BE" dirty="0" err="1"/>
+              <a:t>days</a:t>
+            </a:r>
+            <a:r>
+              <a:rPr lang="fr-BE" dirty="0"/>
+              <a:t> tests(</a:t>
+            </a:r>
+            <a:r>
+              <a:rPr lang="fr-BE" dirty="0" err="1"/>
+              <a:t>cont</a:t>
+            </a:r>
+            <a:r>
+              <a:rPr lang="fr-BE" dirty="0"/>
+              <a:t>.)</a:t>
+            </a:r>
+            <a:endParaRPr lang="en-GB" dirty="0"/>
           </a:p>
         </p:txBody>
       </p:sp>
@@ -9369,7 +9393,160 @@
           <a:bodyPr/>
           <a:lstStyle/>
           <a:p>
-            <a:endParaRPr lang="en-GB"/>
+            <a:r>
+              <a:rPr lang="en-GB" b="1" dirty="0"/>
+              <a:t>Canova-Hansen test </a:t>
+            </a:r>
+            <a:r>
+              <a:rPr lang="en-GB" dirty="0"/>
+              <a:t>on trading days variables </a:t>
+            </a:r>
+            <a:r>
+              <a:rPr lang="en-GB" b="1" dirty="0"/>
+              <a:t>(R only)</a:t>
+            </a:r>
+          </a:p>
+          <a:p>
+            <a:pPr marL="685800" marR="0" lvl="1" indent="-228600" algn="l" defTabSz="914400" rtl="0" eaLnBrk="1" fontAlgn="auto" latinLnBrk="0" hangingPunct="1">
+              <a:lnSpc>
+                <a:spcPct val="90000"/>
+              </a:lnSpc>
+              <a:spcBef>
+                <a:spcPts val="500"/>
+              </a:spcBef>
+              <a:spcAft>
+                <a:spcPts val="0"/>
+              </a:spcAft>
+              <a:buClrTx/>
+              <a:buSzTx/>
+              <a:buFont typeface="Arial" panose="020B0604020202020204" pitchFamily="34" charset="0"/>
+              <a:buChar char="•"/>
+              <a:tabLst/>
+              <a:defRPr/>
+            </a:pPr>
+            <a:r>
+              <a:rPr kumimoji="0" lang="en-GB" sz="2400" b="0" i="0" u="none" strike="noStrike" kern="1200" cap="none" spc="0" normalizeH="0" baseline="0" noProof="0" dirty="0">
+                <a:ln>
+                  <a:noFill/>
+                </a:ln>
+                <a:solidFill>
+                  <a:srgbClr val="000000"/>
+                </a:solidFill>
+                <a:effectLst/>
+                <a:uLnTx/>
+                <a:uFillTx/>
+                <a:latin typeface="Arial" panose="020B0604020202020204" pitchFamily="34" charset="0"/>
+                <a:ea typeface="+mn-ea"/>
+                <a:cs typeface="+mn-cs"/>
+              </a:rPr>
+              <a:t>test the stability of the coefficients of trading days, using a Lagrange multiplier test.</a:t>
+            </a:r>
+          </a:p>
+          <a:p>
+            <a:pPr marL="685800" marR="0" lvl="1" indent="-228600" algn="l" defTabSz="914400" rtl="0" eaLnBrk="1" fontAlgn="auto" latinLnBrk="0" hangingPunct="1">
+              <a:lnSpc>
+                <a:spcPct val="90000"/>
+              </a:lnSpc>
+              <a:spcBef>
+                <a:spcPts val="500"/>
+              </a:spcBef>
+              <a:spcAft>
+                <a:spcPts val="0"/>
+              </a:spcAft>
+              <a:buClrTx/>
+              <a:buSzTx/>
+              <a:buFont typeface="Arial" panose="020B0604020202020204" pitchFamily="34" charset="0"/>
+              <a:buChar char="•"/>
+              <a:tabLst/>
+              <a:defRPr/>
+            </a:pPr>
+            <a:endParaRPr lang="en-GB" dirty="0">
+              <a:solidFill>
+                <a:srgbClr val="000000"/>
+              </a:solidFill>
+              <a:latin typeface="Arial" panose="020B0604020202020204" pitchFamily="34" charset="0"/>
+            </a:endParaRPr>
+          </a:p>
+          <a:p>
+            <a:pPr>
+              <a:spcBef>
+                <a:spcPts val="500"/>
+              </a:spcBef>
+              <a:defRPr/>
+            </a:pPr>
+            <a:r>
+              <a:rPr kumimoji="0" lang="en-GB" b="0" i="0" u="none" strike="noStrike" kern="1200" cap="none" spc="0" normalizeH="0" baseline="0" noProof="0" dirty="0">
+                <a:ln>
+                  <a:noFill/>
+                </a:ln>
+                <a:solidFill>
+                  <a:srgbClr val="000000"/>
+                </a:solidFill>
+                <a:effectLst/>
+                <a:uLnTx/>
+                <a:uFillTx/>
+                <a:latin typeface="Calibri" panose="020F0502020204030204" pitchFamily="34" charset="0"/>
+                <a:ea typeface="Calibri" panose="020F0502020204030204" pitchFamily="34" charset="0"/>
+                <a:cs typeface="Calibri" panose="020F0502020204030204" pitchFamily="34" charset="0"/>
+              </a:rPr>
+              <a:t>Likelihood test </a:t>
+            </a:r>
+            <a:r>
+              <a:rPr lang="en-GB" dirty="0">
+                <a:solidFill>
+                  <a:srgbClr val="000000"/>
+                </a:solidFill>
+                <a:latin typeface="Calibri" panose="020F0502020204030204" pitchFamily="34" charset="0"/>
+                <a:ea typeface="Calibri" panose="020F0502020204030204" pitchFamily="34" charset="0"/>
+                <a:cs typeface="Calibri" panose="020F0502020204030204" pitchFamily="34" charset="0"/>
+              </a:rPr>
+              <a:t>on time varying trading days coefficients </a:t>
+            </a:r>
+            <a:r>
+              <a:rPr lang="en-GB" b="1" dirty="0"/>
+              <a:t>(R only)</a:t>
+            </a:r>
+          </a:p>
+          <a:p>
+            <a:pPr lvl="1">
+              <a:defRPr/>
+            </a:pPr>
+            <a:r>
+              <a:rPr lang="en-GB" dirty="0">
+                <a:solidFill>
+                  <a:srgbClr val="000000"/>
+                </a:solidFill>
+                <a:latin typeface="Calibri" panose="020F0502020204030204" pitchFamily="34" charset="0"/>
+                <a:ea typeface="Calibri" panose="020F0502020204030204" pitchFamily="34" charset="0"/>
+                <a:cs typeface="Calibri" panose="020F0502020204030204" pitchFamily="34" charset="0"/>
+              </a:rPr>
+              <a:t>rjd3toolkit &gt;= 3.2.5 </a:t>
+            </a:r>
+          </a:p>
+          <a:p>
+            <a:pPr>
+              <a:spcBef>
+                <a:spcPts val="500"/>
+              </a:spcBef>
+              <a:defRPr/>
+            </a:pPr>
+            <a:endParaRPr kumimoji="0" lang="en-GB" b="0" i="0" u="none" strike="noStrike" kern="1200" cap="none" spc="0" normalizeH="0" baseline="0" noProof="0" dirty="0">
+              <a:ln>
+                <a:noFill/>
+              </a:ln>
+              <a:solidFill>
+                <a:srgbClr val="000000"/>
+              </a:solidFill>
+              <a:effectLst/>
+              <a:uLnTx/>
+              <a:uFillTx/>
+              <a:latin typeface="Calibri" panose="020F0502020204030204" pitchFamily="34" charset="0"/>
+              <a:ea typeface="Calibri" panose="020F0502020204030204" pitchFamily="34" charset="0"/>
+              <a:cs typeface="Calibri" panose="020F0502020204030204" pitchFamily="34" charset="0"/>
+            </a:endParaRPr>
+          </a:p>
+          <a:p>
+            <a:endParaRPr lang="en-GB" b="1" dirty="0"/>
           </a:p>
         </p:txBody>
       </p:sp>

</xml_diff>